<commit_message>
combo de seleção da vaga pelo candidato
</commit_message>
<xml_diff>
--- a/BuscaVagas/Apresentacao-19-07-22.pptx
+++ b/BuscaVagas/Apresentacao-19-07-22.pptx
@@ -15,6 +15,7 @@
     <p:sldId id="263" r:id="rId9"/>
     <p:sldId id="264" r:id="rId10"/>
     <p:sldId id="265" r:id="rId11"/>
+    <p:sldId id="266" r:id="rId12"/>
   </p:sldIdLst>
   <p:sldSz cx="12192000" cy="6858000"/>
   <p:notesSz cx="6858000" cy="9144000"/>
@@ -113,6 +114,11 @@
       </a:defRPr>
     </a:lvl9pPr>
   </p:defaultTextStyle>
+  <p:extLst>
+    <p:ext uri="{EFAFB233-063F-42B5-8137-9DF3F51BA10A}">
+      <p15:sldGuideLst xmlns:p15="http://schemas.microsoft.com/office/powerpoint/2012/main"/>
+    </p:ext>
+  </p:extLst>
 </p:presentation>
 </file>
 
@@ -247,7 +253,7 @@
           <a:p>
             <a:fld id="{088387E6-4688-457D-A8B1-6FFD959F420C}" type="datetimeFigureOut">
               <a:rPr lang="pt-BR" smtClean="0"/>
-              <a:t>16/07/2022</a:t>
+              <a:t>18/07/2022</a:t>
             </a:fld>
             <a:endParaRPr lang="pt-BR"/>
           </a:p>
@@ -417,7 +423,7 @@
           <a:p>
             <a:fld id="{088387E6-4688-457D-A8B1-6FFD959F420C}" type="datetimeFigureOut">
               <a:rPr lang="pt-BR" smtClean="0"/>
-              <a:t>16/07/2022</a:t>
+              <a:t>18/07/2022</a:t>
             </a:fld>
             <a:endParaRPr lang="pt-BR"/>
           </a:p>
@@ -597,7 +603,7 @@
           <a:p>
             <a:fld id="{088387E6-4688-457D-A8B1-6FFD959F420C}" type="datetimeFigureOut">
               <a:rPr lang="pt-BR" smtClean="0"/>
-              <a:t>16/07/2022</a:t>
+              <a:t>18/07/2022</a:t>
             </a:fld>
             <a:endParaRPr lang="pt-BR"/>
           </a:p>
@@ -767,7 +773,7 @@
           <a:p>
             <a:fld id="{088387E6-4688-457D-A8B1-6FFD959F420C}" type="datetimeFigureOut">
               <a:rPr lang="pt-BR" smtClean="0"/>
-              <a:t>16/07/2022</a:t>
+              <a:t>18/07/2022</a:t>
             </a:fld>
             <a:endParaRPr lang="pt-BR"/>
           </a:p>
@@ -1013,7 +1019,7 @@
           <a:p>
             <a:fld id="{088387E6-4688-457D-A8B1-6FFD959F420C}" type="datetimeFigureOut">
               <a:rPr lang="pt-BR" smtClean="0"/>
-              <a:t>16/07/2022</a:t>
+              <a:t>18/07/2022</a:t>
             </a:fld>
             <a:endParaRPr lang="pt-BR"/>
           </a:p>
@@ -1245,7 +1251,7 @@
           <a:p>
             <a:fld id="{088387E6-4688-457D-A8B1-6FFD959F420C}" type="datetimeFigureOut">
               <a:rPr lang="pt-BR" smtClean="0"/>
-              <a:t>16/07/2022</a:t>
+              <a:t>18/07/2022</a:t>
             </a:fld>
             <a:endParaRPr lang="pt-BR"/>
           </a:p>
@@ -1612,7 +1618,7 @@
           <a:p>
             <a:fld id="{088387E6-4688-457D-A8B1-6FFD959F420C}" type="datetimeFigureOut">
               <a:rPr lang="pt-BR" smtClean="0"/>
-              <a:t>16/07/2022</a:t>
+              <a:t>18/07/2022</a:t>
             </a:fld>
             <a:endParaRPr lang="pt-BR"/>
           </a:p>
@@ -1730,7 +1736,7 @@
           <a:p>
             <a:fld id="{088387E6-4688-457D-A8B1-6FFD959F420C}" type="datetimeFigureOut">
               <a:rPr lang="pt-BR" smtClean="0"/>
-              <a:t>16/07/2022</a:t>
+              <a:t>18/07/2022</a:t>
             </a:fld>
             <a:endParaRPr lang="pt-BR"/>
           </a:p>
@@ -1825,7 +1831,7 @@
           <a:p>
             <a:fld id="{088387E6-4688-457D-A8B1-6FFD959F420C}" type="datetimeFigureOut">
               <a:rPr lang="pt-BR" smtClean="0"/>
-              <a:t>16/07/2022</a:t>
+              <a:t>18/07/2022</a:t>
             </a:fld>
             <a:endParaRPr lang="pt-BR"/>
           </a:p>
@@ -2102,7 +2108,7 @@
           <a:p>
             <a:fld id="{088387E6-4688-457D-A8B1-6FFD959F420C}" type="datetimeFigureOut">
               <a:rPr lang="pt-BR" smtClean="0"/>
-              <a:t>16/07/2022</a:t>
+              <a:t>18/07/2022</a:t>
             </a:fld>
             <a:endParaRPr lang="pt-BR"/>
           </a:p>
@@ -2355,7 +2361,7 @@
           <a:p>
             <a:fld id="{088387E6-4688-457D-A8B1-6FFD959F420C}" type="datetimeFigureOut">
               <a:rPr lang="pt-BR" smtClean="0"/>
-              <a:t>16/07/2022</a:t>
+              <a:t>18/07/2022</a:t>
             </a:fld>
             <a:endParaRPr lang="pt-BR"/>
           </a:p>
@@ -2568,7 +2574,7 @@
           <a:p>
             <a:fld id="{088387E6-4688-457D-A8B1-6FFD959F420C}" type="datetimeFigureOut">
               <a:rPr lang="pt-BR" smtClean="0"/>
-              <a:t>16/07/2022</a:t>
+              <a:t>18/07/2022</a:t>
             </a:fld>
             <a:endParaRPr lang="pt-BR"/>
           </a:p>
@@ -3100,6 +3106,67 @@
     <p:extLst>
       <p:ext uri="{BB962C8B-B14F-4D97-AF65-F5344CB8AC3E}">
         <p14:creationId xmlns:p14="http://schemas.microsoft.com/office/powerpoint/2010/main" val="2808818092"/>
+      </p:ext>
+    </p:extLst>
+  </p:cSld>
+  <p:clrMapOvr>
+    <a:masterClrMapping/>
+  </p:clrMapOvr>
+  <p:timing>
+    <p:tnLst>
+      <p:par>
+        <p:cTn id="1" dur="indefinite" restart="never" nodeType="tmRoot"/>
+      </p:par>
+    </p:tnLst>
+  </p:timing>
+</p:sld>
+</file>
+
+<file path=ppt/slides/slide11.xml><?xml version="1.0" encoding="utf-8"?>
+<p:sld xmlns:a="http://schemas.openxmlformats.org/drawingml/2006/main" xmlns:r="http://schemas.openxmlformats.org/officeDocument/2006/relationships" xmlns:p="http://schemas.openxmlformats.org/presentationml/2006/main">
+  <p:cSld>
+    <p:spTree>
+      <p:nvGrpSpPr>
+        <p:cNvPr id="1" name=""/>
+        <p:cNvGrpSpPr/>
+        <p:nvPr/>
+      </p:nvGrpSpPr>
+      <p:grpSpPr>
+        <a:xfrm>
+          <a:off x="0" y="0"/>
+          <a:ext cx="0" cy="0"/>
+          <a:chOff x="0" y="0"/>
+          <a:chExt cx="0" cy="0"/>
+        </a:xfrm>
+      </p:grpSpPr>
+      <p:pic>
+        <p:nvPicPr>
+          <p:cNvPr id="2" name="Imagem 1"/>
+          <p:cNvPicPr>
+            <a:picLocks noChangeAspect="1"/>
+          </p:cNvPicPr>
+          <p:nvPr/>
+        </p:nvPicPr>
+        <p:blipFill>
+          <a:blip r:embed="rId2"/>
+          <a:stretch>
+            <a:fillRect/>
+          </a:stretch>
+        </p:blipFill>
+        <p:spPr>
+          <a:xfrm>
+            <a:off x="-409575" y="-228600"/>
+            <a:ext cx="13011150" cy="7315200"/>
+          </a:xfrm>
+          <a:prstGeom prst="rect">
+            <a:avLst/>
+          </a:prstGeom>
+        </p:spPr>
+      </p:pic>
+    </p:spTree>
+    <p:extLst>
+      <p:ext uri="{BB962C8B-B14F-4D97-AF65-F5344CB8AC3E}">
+        <p14:creationId xmlns:p14="http://schemas.microsoft.com/office/powerpoint/2010/main" val="2590825375"/>
       </p:ext>
     </p:extLst>
   </p:cSld>

</xml_diff>